<commit_message>
Added a presentation for lesson 6
</commit_message>
<xml_diff>
--- a/lesson 6/Lesson_6.pptx
+++ b/lesson 6/Lesson_6.pptx
@@ -5,7 +5,7 @@
     <p:sldMasterId id="2147483648" r:id="rId1"/>
   </p:sldMasterIdLst>
   <p:notesMasterIdLst>
-    <p:notesMasterId r:id="rId9"/>
+    <p:notesMasterId r:id="rId13"/>
   </p:notesMasterIdLst>
   <p:sldIdLst>
     <p:sldId id="256" r:id="rId2"/>
@@ -15,6 +15,10 @@
     <p:sldId id="265" r:id="rId6"/>
     <p:sldId id="274" r:id="rId7"/>
     <p:sldId id="277" r:id="rId8"/>
+    <p:sldId id="278" r:id="rId9"/>
+    <p:sldId id="279" r:id="rId10"/>
+    <p:sldId id="280" r:id="rId11"/>
+    <p:sldId id="281" r:id="rId12"/>
   </p:sldIdLst>
   <p:sldSz cx="12192000" cy="6858000"/>
   <p:notesSz cx="6858000" cy="9144000"/>
@@ -125,6 +129,7 @@
 <p1510:revInfo xmlns:a="http://schemas.openxmlformats.org/drawingml/2006/main" xmlns:r="http://schemas.openxmlformats.org/officeDocument/2006/relationships" xmlns:p1510="http://schemas.microsoft.com/office/powerpoint/2015/10/main">
   <p1510:revLst>
     <p1510:client id="{0C6B8EF6-F8A4-7AB8-7F88-BD27EDEFE434}" v="2" dt="2021-12-02T05:38:51.155"/>
+    <p1510:client id="{14D01024-C9C5-DA47-B5B3-F55C2D2478EC}" v="190" dt="2021-12-09T08:20:30.219"/>
     <p1510:client id="{1D00F415-21C9-126B-D811-EECC4BD1021F}" v="336" dt="2021-12-08T16:55:26.595"/>
     <p1510:client id="{58A5EECA-69F4-A2C6-FD0E-DB58BAABE3E1}" v="170" dt="2021-12-08T11:52:11.015"/>
     <p1510:client id="{8D6854E7-4F17-FE40-59D2-55336647B245}" v="392" dt="2021-12-08T17:31:06.388"/>
@@ -4595,6 +4600,734 @@
 </p:sld>
 </file>
 
+<file path=ppt/slides/slide10.xml><?xml version="1.0" encoding="utf-8"?>
+<p:sld xmlns:a="http://schemas.openxmlformats.org/drawingml/2006/main" xmlns:r="http://schemas.openxmlformats.org/officeDocument/2006/relationships" xmlns:p="http://schemas.openxmlformats.org/presentationml/2006/main">
+  <p:cSld>
+    <p:spTree>
+      <p:nvGrpSpPr>
+        <p:cNvPr id="1" name=""/>
+        <p:cNvGrpSpPr/>
+        <p:nvPr/>
+      </p:nvGrpSpPr>
+      <p:grpSpPr>
+        <a:xfrm>
+          <a:off x="0" y="0"/>
+          <a:ext cx="0" cy="0"/>
+          <a:chOff x="0" y="0"/>
+          <a:chExt cx="0" cy="0"/>
+        </a:xfrm>
+      </p:grpSpPr>
+      <p:sp>
+        <p:nvSpPr>
+          <p:cNvPr id="3" name="Прямоугольник 4">
+            <a:extLst>
+              <a:ext uri="{FF2B5EF4-FFF2-40B4-BE49-F238E27FC236}">
+                <a16:creationId xmlns:a16="http://schemas.microsoft.com/office/drawing/2014/main" id="{2962ECE8-0D0C-474D-8CA9-785518323E5A}"/>
+              </a:ext>
+            </a:extLst>
+          </p:cNvPr>
+          <p:cNvSpPr/>
+          <p:nvPr/>
+        </p:nvSpPr>
+        <p:spPr>
+          <a:xfrm>
+            <a:off x="569167" y="242596"/>
+            <a:ext cx="11150082" cy="811763"/>
+          </a:xfrm>
+          <a:prstGeom prst="rect">
+            <a:avLst/>
+          </a:prstGeom>
+        </p:spPr>
+        <p:style>
+          <a:lnRef idx="2">
+            <a:schemeClr val="accent1">
+              <a:shade val="50000"/>
+            </a:schemeClr>
+          </a:lnRef>
+          <a:fillRef idx="1">
+            <a:schemeClr val="accent1"/>
+          </a:fillRef>
+          <a:effectRef idx="0">
+            <a:schemeClr val="accent1"/>
+          </a:effectRef>
+          <a:fontRef idx="minor">
+            <a:schemeClr val="lt1"/>
+          </a:fontRef>
+        </p:style>
+        <p:txBody>
+          <a:bodyPr lIns="91440" tIns="45720" rIns="91440" bIns="45720" rtlCol="0" anchor="ctr"/>
+          <a:lstStyle/>
+          <a:p>
+            <a:pPr algn="ctr"/>
+            <a:r>
+              <a:rPr lang="ru-RU" sz="3200" b="1" dirty="0">
+                <a:ln w="12700" cmpd="sng">
+                  <a:solidFill>
+                    <a:srgbClr val="FFC000"/>
+                  </a:solidFill>
+                  <a:prstDash val="solid"/>
+                </a:ln>
+                <a:solidFill>
+                  <a:srgbClr val="FFC000"/>
+                </a:solidFill>
+                <a:ea typeface="+mn-lt"/>
+                <a:cs typeface="+mn-lt"/>
+              </a:rPr>
+              <a:t>Множество</a:t>
+            </a:r>
+            <a:endParaRPr lang="ru-RU" sz="3200" b="1" dirty="0">
+              <a:ln w="12700" cmpd="sng">
+                <a:solidFill>
+                  <a:srgbClr val="FFC000"/>
+                </a:solidFill>
+                <a:prstDash val="solid"/>
+              </a:ln>
+              <a:solidFill>
+                <a:srgbClr val="FFC000"/>
+              </a:solidFill>
+              <a:cs typeface="Calibri"/>
+            </a:endParaRPr>
+          </a:p>
+        </p:txBody>
+      </p:sp>
+      <p:pic>
+        <p:nvPicPr>
+          <p:cNvPr id="4" name="Graphic 4">
+            <a:extLst>
+              <a:ext uri="{FF2B5EF4-FFF2-40B4-BE49-F238E27FC236}">
+                <a16:creationId xmlns:a16="http://schemas.microsoft.com/office/drawing/2014/main" id="{E698DF82-4B69-4505-BD12-47DB718CD250}"/>
+              </a:ext>
+            </a:extLst>
+          </p:cNvPr>
+          <p:cNvPicPr>
+            <a:picLocks noChangeAspect="1"/>
+          </p:cNvPicPr>
+          <p:nvPr/>
+        </p:nvPicPr>
+        <p:blipFill>
+          <a:blip r:embed="rId2">
+            <a:extLst>
+              <a:ext uri="{96DAC541-7B7A-43D3-8B79-37D633B846F1}">
+                <asvg:svgBlip xmlns:asvg="http://schemas.microsoft.com/office/drawing/2016/SVG/main" r:embed="rId3"/>
+              </a:ext>
+            </a:extLst>
+          </a:blip>
+          <a:stretch>
+            <a:fillRect/>
+          </a:stretch>
+        </p:blipFill>
+        <p:spPr>
+          <a:xfrm>
+            <a:off x="3806093" y="1301261"/>
+            <a:ext cx="4032738" cy="3591169"/>
+          </a:xfrm>
+          <a:prstGeom prst="rect">
+            <a:avLst/>
+          </a:prstGeom>
+        </p:spPr>
+      </p:pic>
+      <p:sp>
+        <p:nvSpPr>
+          <p:cNvPr id="5" name="Rectangle: Rounded Corners 4">
+            <a:extLst>
+              <a:ext uri="{FF2B5EF4-FFF2-40B4-BE49-F238E27FC236}">
+                <a16:creationId xmlns:a16="http://schemas.microsoft.com/office/drawing/2014/main" id="{4B1647E3-E01A-4654-8118-B58712CDED42}"/>
+              </a:ext>
+            </a:extLst>
+          </p:cNvPr>
+          <p:cNvSpPr/>
+          <p:nvPr/>
+        </p:nvSpPr>
+        <p:spPr>
+          <a:xfrm>
+            <a:off x="1311030" y="5228491"/>
+            <a:ext cx="9104922" cy="1328614"/>
+          </a:xfrm>
+          <a:prstGeom prst="roundRect">
+            <a:avLst/>
+          </a:prstGeom>
+        </p:spPr>
+        <p:style>
+          <a:lnRef idx="2">
+            <a:schemeClr val="accent1">
+              <a:shade val="50000"/>
+            </a:schemeClr>
+          </a:lnRef>
+          <a:fillRef idx="1">
+            <a:schemeClr val="accent1"/>
+          </a:fillRef>
+          <a:effectRef idx="0">
+            <a:schemeClr val="accent1"/>
+          </a:effectRef>
+          <a:fontRef idx="minor">
+            <a:schemeClr val="lt1"/>
+          </a:fontRef>
+        </p:style>
+        <p:txBody>
+          <a:bodyPr lIns="91440" tIns="45720" rIns="91440" bIns="45720" rtlCol="0" anchor="ctr"/>
+          <a:lstStyle/>
+          <a:p>
+            <a:pPr algn="ctr"/>
+            <a:r>
+              <a:rPr lang="en-US" dirty="0" err="1">
+                <a:solidFill>
+                  <a:schemeClr val="accent4"/>
+                </a:solidFill>
+                <a:ea typeface="+mn-lt"/>
+                <a:cs typeface="+mn-lt"/>
+              </a:rPr>
+              <a:t>Множества</a:t>
+            </a:r>
+            <a:r>
+              <a:rPr lang="en-US" dirty="0">
+                <a:solidFill>
+                  <a:schemeClr val="accent4"/>
+                </a:solidFill>
+                <a:ea typeface="+mn-lt"/>
+                <a:cs typeface="+mn-lt"/>
+              </a:rPr>
+              <a:t> </a:t>
+            </a:r>
+            <a:r>
+              <a:rPr lang="en-US" dirty="0">
+                <a:ea typeface="+mn-lt"/>
+                <a:cs typeface="+mn-lt"/>
+              </a:rPr>
+              <a:t>– </a:t>
+            </a:r>
+            <a:r>
+              <a:rPr lang="en-US" dirty="0" err="1">
+                <a:ea typeface="+mn-lt"/>
+                <a:cs typeface="+mn-lt"/>
+              </a:rPr>
+              <a:t>это</a:t>
+            </a:r>
+            <a:r>
+              <a:rPr lang="en-US" dirty="0">
+                <a:ea typeface="+mn-lt"/>
+                <a:cs typeface="+mn-lt"/>
+              </a:rPr>
+              <a:t> </a:t>
+            </a:r>
+            <a:r>
+              <a:rPr lang="en-US" dirty="0" err="1">
+                <a:ea typeface="+mn-lt"/>
+                <a:cs typeface="+mn-lt"/>
+              </a:rPr>
+              <a:t>неупорядоченные</a:t>
+            </a:r>
+            <a:r>
+              <a:rPr lang="en-US" dirty="0">
+                <a:ea typeface="+mn-lt"/>
+                <a:cs typeface="+mn-lt"/>
+              </a:rPr>
+              <a:t> </a:t>
+            </a:r>
+            <a:r>
+              <a:rPr lang="en-US" dirty="0" err="1">
+                <a:ea typeface="+mn-lt"/>
+                <a:cs typeface="+mn-lt"/>
+              </a:rPr>
+              <a:t>наборы</a:t>
+            </a:r>
+            <a:r>
+              <a:rPr lang="en-US" dirty="0">
+                <a:ea typeface="+mn-lt"/>
+                <a:cs typeface="+mn-lt"/>
+              </a:rPr>
+              <a:t> </a:t>
+            </a:r>
+            <a:r>
+              <a:rPr lang="en-US" dirty="0" err="1">
+                <a:ea typeface="+mn-lt"/>
+                <a:cs typeface="+mn-lt"/>
+              </a:rPr>
+              <a:t>простых</a:t>
+            </a:r>
+            <a:r>
+              <a:rPr lang="en-US" dirty="0">
+                <a:ea typeface="+mn-lt"/>
+                <a:cs typeface="+mn-lt"/>
+              </a:rPr>
+              <a:t> </a:t>
+            </a:r>
+            <a:r>
+              <a:rPr lang="en-US" dirty="0" err="1">
+                <a:ea typeface="+mn-lt"/>
+                <a:cs typeface="+mn-lt"/>
+              </a:rPr>
+              <a:t>объектов</a:t>
+            </a:r>
+            <a:r>
+              <a:rPr lang="en-US" dirty="0">
+                <a:ea typeface="+mn-lt"/>
+                <a:cs typeface="+mn-lt"/>
+              </a:rPr>
+              <a:t>. </a:t>
+            </a:r>
+            <a:r>
+              <a:rPr lang="en-US" dirty="0" err="1">
+                <a:ea typeface="+mn-lt"/>
+                <a:cs typeface="+mn-lt"/>
+              </a:rPr>
+              <a:t>Они</a:t>
+            </a:r>
+            <a:r>
+              <a:rPr lang="en-US" dirty="0">
+                <a:ea typeface="+mn-lt"/>
+                <a:cs typeface="+mn-lt"/>
+              </a:rPr>
+              <a:t> </a:t>
+            </a:r>
+            <a:r>
+              <a:rPr lang="en-US" dirty="0" err="1">
+                <a:ea typeface="+mn-lt"/>
+                <a:cs typeface="+mn-lt"/>
+              </a:rPr>
+              <a:t>необходимы</a:t>
+            </a:r>
+            <a:r>
+              <a:rPr lang="en-US" dirty="0">
+                <a:ea typeface="+mn-lt"/>
+                <a:cs typeface="+mn-lt"/>
+              </a:rPr>
+              <a:t> </a:t>
+            </a:r>
+            <a:r>
+              <a:rPr lang="en-US" dirty="0" err="1">
+                <a:ea typeface="+mn-lt"/>
+                <a:cs typeface="+mn-lt"/>
+              </a:rPr>
+              <a:t>тогда</a:t>
+            </a:r>
+            <a:r>
+              <a:rPr lang="en-US" dirty="0">
+                <a:ea typeface="+mn-lt"/>
+                <a:cs typeface="+mn-lt"/>
+              </a:rPr>
+              <a:t>, </a:t>
+            </a:r>
+            <a:r>
+              <a:rPr lang="en-US" dirty="0" err="1">
+                <a:ea typeface="+mn-lt"/>
+                <a:cs typeface="+mn-lt"/>
+              </a:rPr>
+              <a:t>когда</a:t>
+            </a:r>
+            <a:r>
+              <a:rPr lang="en-US" dirty="0">
+                <a:ea typeface="+mn-lt"/>
+                <a:cs typeface="+mn-lt"/>
+              </a:rPr>
+              <a:t> </a:t>
+            </a:r>
+            <a:r>
+              <a:rPr lang="en-US" dirty="0" err="1">
+                <a:ea typeface="+mn-lt"/>
+                <a:cs typeface="+mn-lt"/>
+              </a:rPr>
+              <a:t>присутствие</a:t>
+            </a:r>
+            <a:r>
+              <a:rPr lang="en-US" dirty="0">
+                <a:ea typeface="+mn-lt"/>
+                <a:cs typeface="+mn-lt"/>
+              </a:rPr>
+              <a:t> </a:t>
+            </a:r>
+            <a:r>
+              <a:rPr lang="en-US" dirty="0" err="1">
+                <a:ea typeface="+mn-lt"/>
+                <a:cs typeface="+mn-lt"/>
+              </a:rPr>
+              <a:t>объекта</a:t>
+            </a:r>
+            <a:r>
+              <a:rPr lang="en-US" dirty="0">
+                <a:ea typeface="+mn-lt"/>
+                <a:cs typeface="+mn-lt"/>
+              </a:rPr>
+              <a:t> в </a:t>
+            </a:r>
+            <a:r>
+              <a:rPr lang="en-US" dirty="0" err="1">
+                <a:ea typeface="+mn-lt"/>
+                <a:cs typeface="+mn-lt"/>
+              </a:rPr>
+              <a:t>наборе</a:t>
+            </a:r>
+            <a:r>
+              <a:rPr lang="en-US" dirty="0">
+                <a:ea typeface="+mn-lt"/>
+                <a:cs typeface="+mn-lt"/>
+              </a:rPr>
+              <a:t> </a:t>
+            </a:r>
+            <a:r>
+              <a:rPr lang="en-US" dirty="0" err="1">
+                <a:ea typeface="+mn-lt"/>
+                <a:cs typeface="+mn-lt"/>
+              </a:rPr>
+              <a:t>важнее</a:t>
+            </a:r>
+            <a:r>
+              <a:rPr lang="en-US" dirty="0">
+                <a:ea typeface="+mn-lt"/>
+                <a:cs typeface="+mn-lt"/>
+              </a:rPr>
+              <a:t> </a:t>
+            </a:r>
+            <a:r>
+              <a:rPr lang="en-US" dirty="0" err="1">
+                <a:ea typeface="+mn-lt"/>
+                <a:cs typeface="+mn-lt"/>
+              </a:rPr>
+              <a:t>порядка</a:t>
+            </a:r>
+            <a:r>
+              <a:rPr lang="en-US" dirty="0">
+                <a:ea typeface="+mn-lt"/>
+                <a:cs typeface="+mn-lt"/>
+              </a:rPr>
+              <a:t> </a:t>
+            </a:r>
+            <a:r>
+              <a:rPr lang="en-US" dirty="0" err="1">
+                <a:ea typeface="+mn-lt"/>
+                <a:cs typeface="+mn-lt"/>
+              </a:rPr>
+              <a:t>или</a:t>
+            </a:r>
+            <a:r>
+              <a:rPr lang="en-US" dirty="0">
+                <a:ea typeface="+mn-lt"/>
+                <a:cs typeface="+mn-lt"/>
+              </a:rPr>
+              <a:t> </a:t>
+            </a:r>
+            <a:r>
+              <a:rPr lang="en-US" dirty="0" err="1">
+                <a:ea typeface="+mn-lt"/>
+                <a:cs typeface="+mn-lt"/>
+              </a:rPr>
+              <a:t>того</a:t>
+            </a:r>
+            <a:r>
+              <a:rPr lang="en-US" dirty="0">
+                <a:ea typeface="+mn-lt"/>
+                <a:cs typeface="+mn-lt"/>
+              </a:rPr>
+              <a:t>, </a:t>
+            </a:r>
+            <a:r>
+              <a:rPr lang="en-US" dirty="0" err="1">
+                <a:ea typeface="+mn-lt"/>
+                <a:cs typeface="+mn-lt"/>
+              </a:rPr>
+              <a:t>сколько</a:t>
+            </a:r>
+            <a:r>
+              <a:rPr lang="en-US" dirty="0">
+                <a:ea typeface="+mn-lt"/>
+                <a:cs typeface="+mn-lt"/>
+              </a:rPr>
+              <a:t> </a:t>
+            </a:r>
+            <a:r>
+              <a:rPr lang="en-US" dirty="0" err="1">
+                <a:ea typeface="+mn-lt"/>
+                <a:cs typeface="+mn-lt"/>
+              </a:rPr>
+              <a:t>раз</a:t>
+            </a:r>
+            <a:r>
+              <a:rPr lang="en-US" dirty="0">
+                <a:ea typeface="+mn-lt"/>
+                <a:cs typeface="+mn-lt"/>
+              </a:rPr>
+              <a:t> </a:t>
+            </a:r>
+            <a:r>
+              <a:rPr lang="en-US" dirty="0" err="1">
+                <a:ea typeface="+mn-lt"/>
+                <a:cs typeface="+mn-lt"/>
+              </a:rPr>
+              <a:t>данный</a:t>
+            </a:r>
+            <a:r>
+              <a:rPr lang="en-US" dirty="0">
+                <a:ea typeface="+mn-lt"/>
+                <a:cs typeface="+mn-lt"/>
+              </a:rPr>
+              <a:t> </a:t>
+            </a:r>
+            <a:r>
+              <a:rPr lang="en-US" dirty="0" err="1">
+                <a:ea typeface="+mn-lt"/>
+                <a:cs typeface="+mn-lt"/>
+              </a:rPr>
+              <a:t>объект</a:t>
+            </a:r>
+            <a:r>
+              <a:rPr lang="en-US" dirty="0">
+                <a:ea typeface="+mn-lt"/>
+                <a:cs typeface="+mn-lt"/>
+              </a:rPr>
+              <a:t> </a:t>
+            </a:r>
+            <a:r>
+              <a:rPr lang="en-US" dirty="0" err="1">
+                <a:ea typeface="+mn-lt"/>
+                <a:cs typeface="+mn-lt"/>
+              </a:rPr>
+              <a:t>там</a:t>
+            </a:r>
+            <a:r>
+              <a:rPr lang="en-US" dirty="0">
+                <a:ea typeface="+mn-lt"/>
+                <a:cs typeface="+mn-lt"/>
+              </a:rPr>
+              <a:t> </a:t>
+            </a:r>
+            <a:r>
+              <a:rPr lang="en-US" dirty="0" err="1">
+                <a:ea typeface="+mn-lt"/>
+                <a:cs typeface="+mn-lt"/>
+              </a:rPr>
+              <a:t>встречается</a:t>
+            </a:r>
+            <a:r>
+              <a:rPr lang="en-US" dirty="0">
+                <a:ea typeface="+mn-lt"/>
+                <a:cs typeface="+mn-lt"/>
+              </a:rPr>
+              <a:t>.</a:t>
+            </a:r>
+            <a:endParaRPr lang="en-US">
+              <a:cs typeface="Calibri"/>
+            </a:endParaRPr>
+          </a:p>
+        </p:txBody>
+      </p:sp>
+    </p:spTree>
+    <p:extLst>
+      <p:ext uri="{BB962C8B-B14F-4D97-AF65-F5344CB8AC3E}">
+        <p14:creationId xmlns:p14="http://schemas.microsoft.com/office/powerpoint/2010/main" val="3918137496"/>
+      </p:ext>
+    </p:extLst>
+  </p:cSld>
+  <p:clrMapOvr>
+    <a:masterClrMapping/>
+  </p:clrMapOvr>
+</p:sld>
+</file>
+
+<file path=ppt/slides/slide11.xml><?xml version="1.0" encoding="utf-8"?>
+<p:sld xmlns:a="http://schemas.openxmlformats.org/drawingml/2006/main" xmlns:r="http://schemas.openxmlformats.org/officeDocument/2006/relationships" xmlns:p="http://schemas.openxmlformats.org/presentationml/2006/main">
+  <p:cSld>
+    <p:spTree>
+      <p:nvGrpSpPr>
+        <p:cNvPr id="1" name=""/>
+        <p:cNvGrpSpPr/>
+        <p:nvPr/>
+      </p:nvGrpSpPr>
+      <p:grpSpPr>
+        <a:xfrm>
+          <a:off x="0" y="0"/>
+          <a:ext cx="0" cy="0"/>
+          <a:chOff x="0" y="0"/>
+          <a:chExt cx="0" cy="0"/>
+        </a:xfrm>
+      </p:grpSpPr>
+      <p:sp>
+        <p:nvSpPr>
+          <p:cNvPr id="3" name="Прямоугольник 4">
+            <a:extLst>
+              <a:ext uri="{FF2B5EF4-FFF2-40B4-BE49-F238E27FC236}">
+                <a16:creationId xmlns:a16="http://schemas.microsoft.com/office/drawing/2014/main" id="{E64FC7F2-593A-4EB0-AE61-F33B5533A5A5}"/>
+              </a:ext>
+            </a:extLst>
+          </p:cNvPr>
+          <p:cNvSpPr/>
+          <p:nvPr/>
+        </p:nvSpPr>
+        <p:spPr>
+          <a:xfrm>
+            <a:off x="569167" y="242596"/>
+            <a:ext cx="11150082" cy="811763"/>
+          </a:xfrm>
+          <a:prstGeom prst="rect">
+            <a:avLst/>
+          </a:prstGeom>
+        </p:spPr>
+        <p:style>
+          <a:lnRef idx="2">
+            <a:schemeClr val="accent1">
+              <a:shade val="50000"/>
+            </a:schemeClr>
+          </a:lnRef>
+          <a:fillRef idx="1">
+            <a:schemeClr val="accent1"/>
+          </a:fillRef>
+          <a:effectRef idx="0">
+            <a:schemeClr val="accent1"/>
+          </a:effectRef>
+          <a:fontRef idx="minor">
+            <a:schemeClr val="lt1"/>
+          </a:fontRef>
+        </p:style>
+        <p:txBody>
+          <a:bodyPr lIns="91440" tIns="45720" rIns="91440" bIns="45720" rtlCol="0" anchor="ctr"/>
+          <a:lstStyle/>
+          <a:p>
+            <a:pPr algn="ctr"/>
+            <a:r>
+              <a:rPr lang="ru-RU" sz="3200" b="1" dirty="0">
+                <a:ln w="12700" cmpd="sng">
+                  <a:solidFill>
+                    <a:srgbClr val="FFC000"/>
+                  </a:solidFill>
+                  <a:prstDash val="solid"/>
+                </a:ln>
+                <a:solidFill>
+                  <a:srgbClr val="FFC000"/>
+                </a:solidFill>
+                <a:ea typeface="+mn-lt"/>
+                <a:cs typeface="+mn-lt"/>
+              </a:rPr>
+              <a:t>Работа с множествами</a:t>
+            </a:r>
+            <a:endParaRPr lang="ru-RU" sz="3200" b="1" dirty="0">
+              <a:ln w="12700" cmpd="sng">
+                <a:solidFill>
+                  <a:srgbClr val="FFC000"/>
+                </a:solidFill>
+                <a:prstDash val="solid"/>
+              </a:ln>
+              <a:solidFill>
+                <a:srgbClr val="FFC000"/>
+              </a:solidFill>
+              <a:cs typeface="Calibri"/>
+            </a:endParaRPr>
+          </a:p>
+        </p:txBody>
+      </p:sp>
+      <p:pic>
+        <p:nvPicPr>
+          <p:cNvPr id="4" name="Picture 4">
+            <a:extLst>
+              <a:ext uri="{FF2B5EF4-FFF2-40B4-BE49-F238E27FC236}">
+                <a16:creationId xmlns:a16="http://schemas.microsoft.com/office/drawing/2014/main" id="{CC597184-A3B4-4265-A83B-7BBABD2279BA}"/>
+              </a:ext>
+            </a:extLst>
+          </p:cNvPr>
+          <p:cNvPicPr>
+            <a:picLocks noChangeAspect="1"/>
+          </p:cNvPicPr>
+          <p:nvPr/>
+        </p:nvPicPr>
+        <p:blipFill>
+          <a:blip r:embed="rId2"/>
+          <a:stretch>
+            <a:fillRect/>
+          </a:stretch>
+        </p:blipFill>
+        <p:spPr>
+          <a:xfrm>
+            <a:off x="1246554" y="1533082"/>
+            <a:ext cx="4716584" cy="4690607"/>
+          </a:xfrm>
+          <a:prstGeom prst="rect">
+            <a:avLst/>
+          </a:prstGeom>
+        </p:spPr>
+      </p:pic>
+      <p:pic>
+        <p:nvPicPr>
+          <p:cNvPr id="5" name="Picture 5">
+            <a:extLst>
+              <a:ext uri="{FF2B5EF4-FFF2-40B4-BE49-F238E27FC236}">
+                <a16:creationId xmlns:a16="http://schemas.microsoft.com/office/drawing/2014/main" id="{AA280039-002D-4EA2-AF81-78A2F449F655}"/>
+              </a:ext>
+            </a:extLst>
+          </p:cNvPr>
+          <p:cNvPicPr>
+            <a:picLocks noChangeAspect="1"/>
+          </p:cNvPicPr>
+          <p:nvPr/>
+        </p:nvPicPr>
+        <p:blipFill>
+          <a:blip r:embed="rId3"/>
+          <a:stretch>
+            <a:fillRect/>
+          </a:stretch>
+        </p:blipFill>
+        <p:spPr>
+          <a:xfrm>
+            <a:off x="6873630" y="2341567"/>
+            <a:ext cx="3895969" cy="1090480"/>
+          </a:xfrm>
+          <a:prstGeom prst="rect">
+            <a:avLst/>
+          </a:prstGeom>
+        </p:spPr>
+      </p:pic>
+      <p:sp>
+        <p:nvSpPr>
+          <p:cNvPr id="7" name="TextBox 6">
+            <a:extLst>
+              <a:ext uri="{FF2B5EF4-FFF2-40B4-BE49-F238E27FC236}">
+                <a16:creationId xmlns:a16="http://schemas.microsoft.com/office/drawing/2014/main" id="{76C01B13-4943-4515-88AF-D56FBE6FC0FA}"/>
+              </a:ext>
+            </a:extLst>
+          </p:cNvPr>
+          <p:cNvSpPr txBox="1"/>
+          <p:nvPr/>
+        </p:nvSpPr>
+        <p:spPr>
+          <a:xfrm>
+            <a:off x="6473091" y="1627553"/>
+            <a:ext cx="2743199" cy="369332"/>
+          </a:xfrm>
+          <a:prstGeom prst="rect">
+            <a:avLst/>
+          </a:prstGeom>
+          <a:noFill/>
+        </p:spPr>
+        <p:txBody>
+          <a:bodyPr rot="0" spcFirstLastPara="0" vertOverflow="overflow" horzOverflow="overflow" vert="horz" wrap="square" lIns="91440" tIns="45720" rIns="91440" bIns="45720" numCol="1" spcCol="0" rtlCol="0" fromWordArt="0" anchor="t" anchorCtr="0" forceAA="0" compatLnSpc="1">
+            <a:prstTxWarp prst="textNoShape">
+              <a:avLst/>
+            </a:prstTxWarp>
+            <a:spAutoFit/>
+          </a:bodyPr>
+          <a:lstStyle/>
+          <a:p>
+            <a:pPr algn="l"/>
+            <a:r>
+              <a:rPr lang="en-US" dirty="0" err="1"/>
+              <a:t>Вывод</a:t>
+            </a:r>
+            <a:r>
+              <a:rPr lang="en-US" dirty="0"/>
+              <a:t>:</a:t>
+            </a:r>
+          </a:p>
+        </p:txBody>
+      </p:sp>
+    </p:spTree>
+    <p:extLst>
+      <p:ext uri="{BB962C8B-B14F-4D97-AF65-F5344CB8AC3E}">
+        <p14:creationId xmlns:p14="http://schemas.microsoft.com/office/powerpoint/2010/main" val="4188749105"/>
+      </p:ext>
+    </p:extLst>
+  </p:cSld>
+  <p:clrMapOvr>
+    <a:masterClrMapping/>
+  </p:clrMapOvr>
+</p:sld>
+</file>
+
 <file path=ppt/slides/slide2.xml><?xml version="1.0" encoding="utf-8"?>
 <p:sld xmlns:a="http://schemas.openxmlformats.org/drawingml/2006/main" xmlns:r="http://schemas.openxmlformats.org/officeDocument/2006/relationships" xmlns:p="http://schemas.openxmlformats.org/presentationml/2006/main">
   <p:cSld>
@@ -6269,7 +7002,7 @@
                 </a:solidFill>
                 <a:cs typeface="Calibri"/>
               </a:rPr>
-              <a:t>Методы списков</a:t>
+              <a:t>Работа со списками</a:t>
             </a:r>
           </a:p>
         </p:txBody>
@@ -7475,10 +8208,1217 @@
           </a:p>
         </p:txBody>
       </p:sp>
+      <p:pic>
+        <p:nvPicPr>
+          <p:cNvPr id="2" name="Picture 3">
+            <a:extLst>
+              <a:ext uri="{FF2B5EF4-FFF2-40B4-BE49-F238E27FC236}">
+                <a16:creationId xmlns:a16="http://schemas.microsoft.com/office/drawing/2014/main" id="{4906ED58-4BA3-4FCD-861B-92F8DE7104D0}"/>
+              </a:ext>
+            </a:extLst>
+          </p:cNvPr>
+          <p:cNvPicPr>
+            <a:picLocks noChangeAspect="1"/>
+          </p:cNvPicPr>
+          <p:nvPr/>
+        </p:nvPicPr>
+        <p:blipFill>
+          <a:blip r:embed="rId2"/>
+          <a:stretch>
+            <a:fillRect/>
+          </a:stretch>
+        </p:blipFill>
+        <p:spPr>
+          <a:xfrm>
+            <a:off x="1074788" y="1798242"/>
+            <a:ext cx="4540738" cy="2840943"/>
+          </a:xfrm>
+          <a:prstGeom prst="rect">
+            <a:avLst/>
+          </a:prstGeom>
+        </p:spPr>
+      </p:pic>
+      <p:pic>
+        <p:nvPicPr>
+          <p:cNvPr id="4" name="Picture 4">
+            <a:extLst>
+              <a:ext uri="{FF2B5EF4-FFF2-40B4-BE49-F238E27FC236}">
+                <a16:creationId xmlns:a16="http://schemas.microsoft.com/office/drawing/2014/main" id="{BD3920B9-9EFE-4624-98AC-0CA6BB254549}"/>
+              </a:ext>
+            </a:extLst>
+          </p:cNvPr>
+          <p:cNvPicPr>
+            <a:picLocks noChangeAspect="1"/>
+          </p:cNvPicPr>
+          <p:nvPr/>
+        </p:nvPicPr>
+        <p:blipFill>
+          <a:blip r:embed="rId3"/>
+          <a:stretch>
+            <a:fillRect/>
+          </a:stretch>
+        </p:blipFill>
+        <p:spPr>
+          <a:xfrm>
+            <a:off x="5857631" y="1793945"/>
+            <a:ext cx="6269892" cy="1560495"/>
+          </a:xfrm>
+          <a:prstGeom prst="rect">
+            <a:avLst/>
+          </a:prstGeom>
+        </p:spPr>
+      </p:pic>
+      <p:sp>
+        <p:nvSpPr>
+          <p:cNvPr id="6" name="TextBox 5">
+            <a:extLst>
+              <a:ext uri="{FF2B5EF4-FFF2-40B4-BE49-F238E27FC236}">
+                <a16:creationId xmlns:a16="http://schemas.microsoft.com/office/drawing/2014/main" id="{16A6AEB6-71A3-47E2-A70C-7A9D31EB10EF}"/>
+              </a:ext>
+            </a:extLst>
+          </p:cNvPr>
+          <p:cNvSpPr txBox="1"/>
+          <p:nvPr/>
+        </p:nvSpPr>
+        <p:spPr>
+          <a:xfrm>
+            <a:off x="5779477" y="3376246"/>
+            <a:ext cx="2743199" cy="369332"/>
+          </a:xfrm>
+          <a:prstGeom prst="rect">
+            <a:avLst/>
+          </a:prstGeom>
+          <a:noFill/>
+        </p:spPr>
+        <p:txBody>
+          <a:bodyPr rot="0" spcFirstLastPara="0" vertOverflow="overflow" horzOverflow="overflow" vert="horz" wrap="square" lIns="91440" tIns="45720" rIns="91440" bIns="45720" numCol="1" spcCol="0" rtlCol="0" fromWordArt="0" anchor="t" anchorCtr="0" forceAA="0" compatLnSpc="1">
+            <a:prstTxWarp prst="textNoShape">
+              <a:avLst/>
+            </a:prstTxWarp>
+            <a:spAutoFit/>
+          </a:bodyPr>
+          <a:lstStyle/>
+          <a:p>
+            <a:pPr algn="l"/>
+            <a:r>
+              <a:rPr lang="en-US" dirty="0" err="1"/>
+              <a:t>Вывод</a:t>
+            </a:r>
+            <a:r>
+              <a:rPr lang="en-US" dirty="0"/>
+              <a:t>:</a:t>
+            </a:r>
+          </a:p>
+        </p:txBody>
+      </p:sp>
+      <p:pic>
+        <p:nvPicPr>
+          <p:cNvPr id="7" name="Picture 7">
+            <a:extLst>
+              <a:ext uri="{FF2B5EF4-FFF2-40B4-BE49-F238E27FC236}">
+                <a16:creationId xmlns:a16="http://schemas.microsoft.com/office/drawing/2014/main" id="{14AFBBB3-0D1A-4DF7-88AB-755CA73ADA5E}"/>
+              </a:ext>
+            </a:extLst>
+          </p:cNvPr>
+          <p:cNvPicPr>
+            <a:picLocks noChangeAspect="1"/>
+          </p:cNvPicPr>
+          <p:nvPr/>
+        </p:nvPicPr>
+        <p:blipFill>
+          <a:blip r:embed="rId4"/>
+          <a:stretch>
+            <a:fillRect/>
+          </a:stretch>
+        </p:blipFill>
+        <p:spPr>
+          <a:xfrm>
+            <a:off x="5857630" y="3878090"/>
+            <a:ext cx="6054969" cy="821203"/>
+          </a:xfrm>
+          <a:prstGeom prst="rect">
+            <a:avLst/>
+          </a:prstGeom>
+        </p:spPr>
+      </p:pic>
+      <p:sp>
+        <p:nvSpPr>
+          <p:cNvPr id="9" name="Rectangle: Rounded Corners 8">
+            <a:extLst>
+              <a:ext uri="{FF2B5EF4-FFF2-40B4-BE49-F238E27FC236}">
+                <a16:creationId xmlns:a16="http://schemas.microsoft.com/office/drawing/2014/main" id="{5B4410A5-E3CF-4CCB-A487-D94B849946A7}"/>
+              </a:ext>
+            </a:extLst>
+          </p:cNvPr>
+          <p:cNvSpPr/>
+          <p:nvPr/>
+        </p:nvSpPr>
+        <p:spPr>
+          <a:xfrm>
+            <a:off x="1149951" y="5175554"/>
+            <a:ext cx="10130689" cy="1064846"/>
+          </a:xfrm>
+          <a:prstGeom prst="roundRect">
+            <a:avLst/>
+          </a:prstGeom>
+        </p:spPr>
+        <p:style>
+          <a:lnRef idx="2">
+            <a:schemeClr val="accent1">
+              <a:shade val="50000"/>
+            </a:schemeClr>
+          </a:lnRef>
+          <a:fillRef idx="1">
+            <a:schemeClr val="accent1"/>
+          </a:fillRef>
+          <a:effectRef idx="0">
+            <a:schemeClr val="accent1"/>
+          </a:effectRef>
+          <a:fontRef idx="minor">
+            <a:schemeClr val="lt1"/>
+          </a:fontRef>
+        </p:style>
+        <p:txBody>
+          <a:bodyPr lIns="91440" tIns="45720" rIns="91440" bIns="45720" rtlCol="0" anchor="ctr"/>
+          <a:lstStyle/>
+          <a:p>
+            <a:r>
+              <a:rPr lang="en-US" dirty="0">
+                <a:ea typeface="+mn-lt"/>
+                <a:cs typeface="+mn-lt"/>
+              </a:rPr>
+              <a:t> </a:t>
+            </a:r>
+            <a:r>
+              <a:rPr lang="en-US" dirty="0">
+                <a:solidFill>
+                  <a:srgbClr val="FFFFFF"/>
+                </a:solidFill>
+                <a:ea typeface="+mn-lt"/>
+                <a:cs typeface="+mn-lt"/>
+              </a:rPr>
+              <a:t>   </a:t>
+            </a:r>
+            <a:r>
+              <a:rPr lang="en-US" dirty="0" err="1">
+                <a:solidFill>
+                  <a:schemeClr val="accent4"/>
+                </a:solidFill>
+                <a:ea typeface="+mn-lt"/>
+                <a:cs typeface="+mn-lt"/>
+              </a:rPr>
+              <a:t>Словарь</a:t>
+            </a:r>
+            <a:r>
+              <a:rPr lang="en-US" dirty="0">
+                <a:solidFill>
+                  <a:schemeClr val="accent4"/>
+                </a:solidFill>
+                <a:ea typeface="+mn-lt"/>
+                <a:cs typeface="+mn-lt"/>
+              </a:rPr>
+              <a:t> </a:t>
+            </a:r>
+            <a:r>
+              <a:rPr lang="en-US" dirty="0">
+                <a:ea typeface="+mn-lt"/>
+                <a:cs typeface="+mn-lt"/>
+              </a:rPr>
+              <a:t>– </a:t>
+            </a:r>
+            <a:r>
+              <a:rPr lang="en-US" dirty="0" err="1">
+                <a:ea typeface="+mn-lt"/>
+                <a:cs typeface="+mn-lt"/>
+              </a:rPr>
+              <a:t>это</a:t>
+            </a:r>
+            <a:r>
+              <a:rPr lang="en-US" dirty="0">
+                <a:ea typeface="+mn-lt"/>
+                <a:cs typeface="+mn-lt"/>
+              </a:rPr>
+              <a:t> </a:t>
+            </a:r>
+            <a:r>
+              <a:rPr lang="en-US" dirty="0" err="1">
+                <a:ea typeface="+mn-lt"/>
+                <a:cs typeface="+mn-lt"/>
+              </a:rPr>
+              <a:t>некий</a:t>
+            </a:r>
+            <a:r>
+              <a:rPr lang="en-US" dirty="0">
+                <a:ea typeface="+mn-lt"/>
+                <a:cs typeface="+mn-lt"/>
+              </a:rPr>
+              <a:t> </a:t>
+            </a:r>
+            <a:r>
+              <a:rPr lang="en-US" dirty="0" err="1">
+                <a:ea typeface="+mn-lt"/>
+                <a:cs typeface="+mn-lt"/>
+              </a:rPr>
+              <a:t>аналог</a:t>
+            </a:r>
+            <a:r>
+              <a:rPr lang="en-US" dirty="0">
+                <a:ea typeface="+mn-lt"/>
+                <a:cs typeface="+mn-lt"/>
+              </a:rPr>
+              <a:t> </a:t>
+            </a:r>
+            <a:r>
+              <a:rPr lang="en-US" dirty="0" err="1">
+                <a:ea typeface="+mn-lt"/>
+                <a:cs typeface="+mn-lt"/>
+              </a:rPr>
+              <a:t>адресной</a:t>
+            </a:r>
+            <a:r>
+              <a:rPr lang="en-US" dirty="0">
+                <a:ea typeface="+mn-lt"/>
+                <a:cs typeface="+mn-lt"/>
+              </a:rPr>
+              <a:t> </a:t>
+            </a:r>
+            <a:r>
+              <a:rPr lang="en-US" dirty="0" err="1">
+                <a:ea typeface="+mn-lt"/>
+                <a:cs typeface="+mn-lt"/>
+              </a:rPr>
+              <a:t>книги</a:t>
+            </a:r>
+            <a:r>
+              <a:rPr lang="en-US" dirty="0">
+                <a:ea typeface="+mn-lt"/>
+                <a:cs typeface="+mn-lt"/>
+              </a:rPr>
+              <a:t>, в </a:t>
+            </a:r>
+            <a:r>
+              <a:rPr lang="en-US" dirty="0" err="1">
+                <a:ea typeface="+mn-lt"/>
+                <a:cs typeface="+mn-lt"/>
+              </a:rPr>
+              <a:t>которой</a:t>
+            </a:r>
+            <a:r>
+              <a:rPr lang="en-US" dirty="0">
+                <a:ea typeface="+mn-lt"/>
+                <a:cs typeface="+mn-lt"/>
+              </a:rPr>
+              <a:t> </a:t>
+            </a:r>
+            <a:r>
+              <a:rPr lang="en-US" dirty="0" err="1">
+                <a:ea typeface="+mn-lt"/>
+                <a:cs typeface="+mn-lt"/>
+              </a:rPr>
+              <a:t>можно</a:t>
+            </a:r>
+            <a:r>
+              <a:rPr lang="en-US" dirty="0">
+                <a:ea typeface="+mn-lt"/>
+                <a:cs typeface="+mn-lt"/>
+              </a:rPr>
+              <a:t> </a:t>
+            </a:r>
+            <a:r>
+              <a:rPr lang="en-US" dirty="0" err="1">
+                <a:ea typeface="+mn-lt"/>
+                <a:cs typeface="+mn-lt"/>
+              </a:rPr>
+              <a:t>найти</a:t>
+            </a:r>
+            <a:r>
+              <a:rPr lang="en-US" dirty="0">
+                <a:ea typeface="+mn-lt"/>
+                <a:cs typeface="+mn-lt"/>
+              </a:rPr>
+              <a:t> </a:t>
+            </a:r>
+            <a:r>
+              <a:rPr lang="en-US" dirty="0" err="1">
+                <a:ea typeface="+mn-lt"/>
+                <a:cs typeface="+mn-lt"/>
+              </a:rPr>
+              <a:t>адрес</a:t>
+            </a:r>
+            <a:r>
+              <a:rPr lang="en-US" dirty="0">
+                <a:ea typeface="+mn-lt"/>
+                <a:cs typeface="+mn-lt"/>
+              </a:rPr>
+              <a:t> </a:t>
+            </a:r>
+            <a:r>
+              <a:rPr lang="en-US" dirty="0" err="1">
+                <a:ea typeface="+mn-lt"/>
+                <a:cs typeface="+mn-lt"/>
+              </a:rPr>
+              <a:t>или</a:t>
+            </a:r>
+            <a:r>
+              <a:rPr lang="en-US" dirty="0">
+                <a:ea typeface="+mn-lt"/>
+                <a:cs typeface="+mn-lt"/>
+              </a:rPr>
+              <a:t> </a:t>
+            </a:r>
+            <a:r>
+              <a:rPr lang="en-US" dirty="0" err="1">
+                <a:ea typeface="+mn-lt"/>
+                <a:cs typeface="+mn-lt"/>
+              </a:rPr>
+              <a:t>контакт</a:t>
+            </a:r>
+            <a:r>
+              <a:rPr lang="en-US" dirty="0">
+                <a:ea typeface="+mn-lt"/>
+                <a:cs typeface="+mn-lt"/>
+              </a:rPr>
+              <a:t>-</a:t>
+            </a:r>
+            <a:endParaRPr lang="en-US" dirty="0" err="1">
+              <a:ea typeface="+mn-lt"/>
+              <a:cs typeface="+mn-lt"/>
+            </a:endParaRPr>
+          </a:p>
+          <a:p>
+            <a:r>
+              <a:rPr lang="en-US" dirty="0" err="1">
+                <a:ea typeface="+mn-lt"/>
+                <a:cs typeface="+mn-lt"/>
+              </a:rPr>
+              <a:t>ную</a:t>
+            </a:r>
+            <a:r>
+              <a:rPr lang="en-US" dirty="0">
+                <a:ea typeface="+mn-lt"/>
+                <a:cs typeface="+mn-lt"/>
+              </a:rPr>
+              <a:t> </a:t>
+            </a:r>
+            <a:r>
+              <a:rPr lang="en-US" dirty="0" err="1">
+                <a:ea typeface="+mn-lt"/>
+                <a:cs typeface="+mn-lt"/>
+              </a:rPr>
+              <a:t>информацию</a:t>
+            </a:r>
+            <a:r>
+              <a:rPr lang="en-US" dirty="0">
+                <a:ea typeface="+mn-lt"/>
+                <a:cs typeface="+mn-lt"/>
+              </a:rPr>
+              <a:t> о </a:t>
+            </a:r>
+            <a:r>
+              <a:rPr lang="en-US" dirty="0" err="1">
+                <a:ea typeface="+mn-lt"/>
+                <a:cs typeface="+mn-lt"/>
+              </a:rPr>
+              <a:t>человеке</a:t>
+            </a:r>
+            <a:r>
+              <a:rPr lang="en-US" dirty="0">
+                <a:ea typeface="+mn-lt"/>
+                <a:cs typeface="+mn-lt"/>
+              </a:rPr>
+              <a:t>, </a:t>
+            </a:r>
+            <a:r>
+              <a:rPr lang="en-US" dirty="0" err="1">
+                <a:ea typeface="+mn-lt"/>
+                <a:cs typeface="+mn-lt"/>
+              </a:rPr>
+              <a:t>зная</a:t>
+            </a:r>
+            <a:r>
+              <a:rPr lang="en-US" dirty="0">
+                <a:ea typeface="+mn-lt"/>
+                <a:cs typeface="+mn-lt"/>
+              </a:rPr>
+              <a:t> </a:t>
+            </a:r>
+            <a:r>
+              <a:rPr lang="en-US" dirty="0" err="1">
+                <a:ea typeface="+mn-lt"/>
+                <a:cs typeface="+mn-lt"/>
+              </a:rPr>
+              <a:t>лишь</a:t>
+            </a:r>
+            <a:r>
+              <a:rPr lang="en-US" dirty="0">
+                <a:ea typeface="+mn-lt"/>
+                <a:cs typeface="+mn-lt"/>
+              </a:rPr>
+              <a:t> </a:t>
+            </a:r>
+            <a:r>
+              <a:rPr lang="en-US" dirty="0" err="1">
+                <a:ea typeface="+mn-lt"/>
+                <a:cs typeface="+mn-lt"/>
+              </a:rPr>
+              <a:t>его</a:t>
+            </a:r>
+            <a:r>
+              <a:rPr lang="en-US" dirty="0">
+                <a:ea typeface="+mn-lt"/>
+                <a:cs typeface="+mn-lt"/>
+              </a:rPr>
+              <a:t> </a:t>
+            </a:r>
+            <a:r>
+              <a:rPr lang="en-US" dirty="0" err="1">
+                <a:ea typeface="+mn-lt"/>
+                <a:cs typeface="+mn-lt"/>
+              </a:rPr>
+              <a:t>имя</a:t>
+            </a:r>
+            <a:r>
+              <a:rPr lang="en-US" dirty="0">
+                <a:ea typeface="+mn-lt"/>
+                <a:cs typeface="+mn-lt"/>
+              </a:rPr>
+              <a:t>; </a:t>
+            </a:r>
+            <a:r>
+              <a:rPr lang="en-US" dirty="0" err="1">
+                <a:ea typeface="+mn-lt"/>
+                <a:cs typeface="+mn-lt"/>
+              </a:rPr>
+              <a:t>т.е</a:t>
+            </a:r>
+            <a:r>
+              <a:rPr lang="en-US" dirty="0">
+                <a:ea typeface="+mn-lt"/>
+                <a:cs typeface="+mn-lt"/>
+              </a:rPr>
+              <a:t>. </a:t>
+            </a:r>
+            <a:r>
+              <a:rPr lang="en-US" dirty="0" err="1">
+                <a:ea typeface="+mn-lt"/>
+                <a:cs typeface="+mn-lt"/>
+              </a:rPr>
+              <a:t>некоторые</a:t>
+            </a:r>
+            <a:r>
+              <a:rPr lang="en-US" dirty="0">
+                <a:ea typeface="+mn-lt"/>
+                <a:cs typeface="+mn-lt"/>
+              </a:rPr>
+              <a:t> </a:t>
+            </a:r>
+            <a:r>
+              <a:rPr lang="en-US" dirty="0" err="1">
+                <a:ea typeface="+mn-lt"/>
+                <a:cs typeface="+mn-lt"/>
+              </a:rPr>
+              <a:t>ключи</a:t>
+            </a:r>
+            <a:r>
+              <a:rPr lang="en-US" dirty="0">
+                <a:ea typeface="+mn-lt"/>
+                <a:cs typeface="+mn-lt"/>
+              </a:rPr>
+              <a:t> (</a:t>
+            </a:r>
+            <a:r>
+              <a:rPr lang="en-US" dirty="0" err="1">
+                <a:ea typeface="+mn-lt"/>
+                <a:cs typeface="+mn-lt"/>
+              </a:rPr>
+              <a:t>имена</a:t>
+            </a:r>
+            <a:r>
+              <a:rPr lang="en-US" dirty="0">
+                <a:ea typeface="+mn-lt"/>
+                <a:cs typeface="+mn-lt"/>
+              </a:rPr>
+              <a:t>) </a:t>
+            </a:r>
+            <a:r>
+              <a:rPr lang="en-US" dirty="0" err="1">
+                <a:ea typeface="+mn-lt"/>
+                <a:cs typeface="+mn-lt"/>
+              </a:rPr>
+              <a:t>связаны</a:t>
+            </a:r>
+            <a:endParaRPr lang="en-US" dirty="0" err="1"/>
+          </a:p>
+          <a:p>
+            <a:r>
+              <a:rPr lang="en-US" dirty="0" err="1">
+                <a:ea typeface="+mn-lt"/>
+                <a:cs typeface="+mn-lt"/>
+              </a:rPr>
+              <a:t>со</a:t>
+            </a:r>
+            <a:r>
+              <a:rPr lang="en-US" dirty="0">
+                <a:ea typeface="+mn-lt"/>
+                <a:cs typeface="+mn-lt"/>
+              </a:rPr>
+              <a:t> </a:t>
+            </a:r>
+            <a:r>
+              <a:rPr lang="en-US" dirty="0" err="1">
+                <a:ea typeface="+mn-lt"/>
+                <a:cs typeface="+mn-lt"/>
+              </a:rPr>
+              <a:t>значениями</a:t>
+            </a:r>
+            <a:r>
+              <a:rPr lang="en-US" dirty="0">
+                <a:ea typeface="+mn-lt"/>
+                <a:cs typeface="+mn-lt"/>
+              </a:rPr>
+              <a:t> (</a:t>
+            </a:r>
+            <a:r>
+              <a:rPr lang="en-US" dirty="0" err="1">
+                <a:ea typeface="+mn-lt"/>
+                <a:cs typeface="+mn-lt"/>
+              </a:rPr>
+              <a:t>информацией</a:t>
+            </a:r>
+            <a:r>
+              <a:rPr lang="en-US" dirty="0">
+                <a:ea typeface="+mn-lt"/>
+                <a:cs typeface="+mn-lt"/>
+              </a:rPr>
+              <a:t>).</a:t>
+            </a:r>
+            <a:endParaRPr lang="en-US" dirty="0"/>
+          </a:p>
+        </p:txBody>
+      </p:sp>
     </p:spTree>
     <p:extLst>
       <p:ext uri="{BB962C8B-B14F-4D97-AF65-F5344CB8AC3E}">
         <p14:creationId xmlns:p14="http://schemas.microsoft.com/office/powerpoint/2010/main" val="29342022"/>
+      </p:ext>
+    </p:extLst>
+  </p:cSld>
+  <p:clrMapOvr>
+    <a:masterClrMapping/>
+  </p:clrMapOvr>
+</p:sld>
+</file>
+
+<file path=ppt/slides/slide8.xml><?xml version="1.0" encoding="utf-8"?>
+<p:sld xmlns:a="http://schemas.openxmlformats.org/drawingml/2006/main" xmlns:r="http://schemas.openxmlformats.org/officeDocument/2006/relationships" xmlns:p="http://schemas.openxmlformats.org/presentationml/2006/main">
+  <p:cSld>
+    <p:spTree>
+      <p:nvGrpSpPr>
+        <p:cNvPr id="1" name=""/>
+        <p:cNvGrpSpPr/>
+        <p:nvPr/>
+      </p:nvGrpSpPr>
+      <p:grpSpPr>
+        <a:xfrm>
+          <a:off x="0" y="0"/>
+          <a:ext cx="0" cy="0"/>
+          <a:chOff x="0" y="0"/>
+          <a:chExt cx="0" cy="0"/>
+        </a:xfrm>
+      </p:grpSpPr>
+      <p:sp>
+        <p:nvSpPr>
+          <p:cNvPr id="3" name="Прямоугольник 4">
+            <a:extLst>
+              <a:ext uri="{FF2B5EF4-FFF2-40B4-BE49-F238E27FC236}">
+                <a16:creationId xmlns:a16="http://schemas.microsoft.com/office/drawing/2014/main" id="{C1D6EBE2-0D3C-4741-A85E-B8B5D250B6BF}"/>
+              </a:ext>
+            </a:extLst>
+          </p:cNvPr>
+          <p:cNvSpPr/>
+          <p:nvPr/>
+        </p:nvSpPr>
+        <p:spPr>
+          <a:xfrm>
+            <a:off x="569167" y="242596"/>
+            <a:ext cx="11150082" cy="811763"/>
+          </a:xfrm>
+          <a:prstGeom prst="rect">
+            <a:avLst/>
+          </a:prstGeom>
+        </p:spPr>
+        <p:style>
+          <a:lnRef idx="2">
+            <a:schemeClr val="accent1">
+              <a:shade val="50000"/>
+            </a:schemeClr>
+          </a:lnRef>
+          <a:fillRef idx="1">
+            <a:schemeClr val="accent1"/>
+          </a:fillRef>
+          <a:effectRef idx="0">
+            <a:schemeClr val="accent1"/>
+          </a:effectRef>
+          <a:fontRef idx="minor">
+            <a:schemeClr val="lt1"/>
+          </a:fontRef>
+        </p:style>
+        <p:txBody>
+          <a:bodyPr lIns="91440" tIns="45720" rIns="91440" bIns="45720" rtlCol="0" anchor="ctr"/>
+          <a:lstStyle/>
+          <a:p>
+            <a:pPr algn="ctr"/>
+            <a:r>
+              <a:rPr lang="ru-RU" sz="3200" b="1" dirty="0">
+                <a:ln w="12700" cmpd="sng">
+                  <a:solidFill>
+                    <a:srgbClr val="FFC000"/>
+                  </a:solidFill>
+                  <a:prstDash val="solid"/>
+                </a:ln>
+                <a:solidFill>
+                  <a:srgbClr val="FFC000"/>
+                </a:solidFill>
+                <a:ea typeface="+mn-lt"/>
+                <a:cs typeface="+mn-lt"/>
+              </a:rPr>
+              <a:t>Работа со словарями</a:t>
+            </a:r>
+            <a:endParaRPr lang="en-US" dirty="0"/>
+          </a:p>
+        </p:txBody>
+      </p:sp>
+      <p:pic>
+        <p:nvPicPr>
+          <p:cNvPr id="4" name="Picture 4">
+            <a:extLst>
+              <a:ext uri="{FF2B5EF4-FFF2-40B4-BE49-F238E27FC236}">
+                <a16:creationId xmlns:a16="http://schemas.microsoft.com/office/drawing/2014/main" id="{CBF26C42-49B6-4852-A146-EE7BEC392A99}"/>
+              </a:ext>
+            </a:extLst>
+          </p:cNvPr>
+          <p:cNvPicPr>
+            <a:picLocks noChangeAspect="1"/>
+          </p:cNvPicPr>
+          <p:nvPr/>
+        </p:nvPicPr>
+        <p:blipFill rotWithShape="1">
+          <a:blip r:embed="rId2"/>
+          <a:srcRect r="10098" b="-249"/>
+          <a:stretch/>
+        </p:blipFill>
+        <p:spPr>
+          <a:xfrm>
+            <a:off x="269631" y="1938462"/>
+            <a:ext cx="5390860" cy="3938463"/>
+          </a:xfrm>
+          <a:prstGeom prst="rect">
+            <a:avLst/>
+          </a:prstGeom>
+        </p:spPr>
+      </p:pic>
+      <p:sp>
+        <p:nvSpPr>
+          <p:cNvPr id="5" name="TextBox 4">
+            <a:extLst>
+              <a:ext uri="{FF2B5EF4-FFF2-40B4-BE49-F238E27FC236}">
+                <a16:creationId xmlns:a16="http://schemas.microsoft.com/office/drawing/2014/main" id="{9110C3C7-9B75-4477-8CF6-D324EA0816B8}"/>
+              </a:ext>
+            </a:extLst>
+          </p:cNvPr>
+          <p:cNvSpPr txBox="1"/>
+          <p:nvPr/>
+        </p:nvSpPr>
+        <p:spPr>
+          <a:xfrm>
+            <a:off x="5828322" y="1314938"/>
+            <a:ext cx="2743199" cy="369332"/>
+          </a:xfrm>
+          <a:prstGeom prst="rect">
+            <a:avLst/>
+          </a:prstGeom>
+          <a:noFill/>
+        </p:spPr>
+        <p:txBody>
+          <a:bodyPr rot="0" spcFirstLastPara="0" vertOverflow="overflow" horzOverflow="overflow" vert="horz" wrap="square" lIns="91440" tIns="45720" rIns="91440" bIns="45720" numCol="1" spcCol="0" rtlCol="0" fromWordArt="0" anchor="t" anchorCtr="0" forceAA="0" compatLnSpc="1">
+            <a:prstTxWarp prst="textNoShape">
+              <a:avLst/>
+            </a:prstTxWarp>
+            <a:spAutoFit/>
+          </a:bodyPr>
+          <a:lstStyle/>
+          <a:p>
+            <a:pPr algn="l"/>
+            <a:r>
+              <a:rPr lang="en-US" dirty="0" err="1"/>
+              <a:t>Вывод</a:t>
+            </a:r>
+            <a:r>
+              <a:rPr lang="en-US" dirty="0"/>
+              <a:t>:</a:t>
+            </a:r>
+          </a:p>
+        </p:txBody>
+      </p:sp>
+      <p:pic>
+        <p:nvPicPr>
+          <p:cNvPr id="6" name="Picture 6">
+            <a:extLst>
+              <a:ext uri="{FF2B5EF4-FFF2-40B4-BE49-F238E27FC236}">
+                <a16:creationId xmlns:a16="http://schemas.microsoft.com/office/drawing/2014/main" id="{C84A4784-D6E7-4280-8808-9525AF40BF88}"/>
+              </a:ext>
+            </a:extLst>
+          </p:cNvPr>
+          <p:cNvPicPr>
+            <a:picLocks noChangeAspect="1"/>
+          </p:cNvPicPr>
+          <p:nvPr/>
+        </p:nvPicPr>
+        <p:blipFill>
+          <a:blip r:embed="rId3"/>
+          <a:stretch>
+            <a:fillRect/>
+          </a:stretch>
+        </p:blipFill>
+        <p:spPr>
+          <a:xfrm>
+            <a:off x="6434016" y="1938427"/>
+            <a:ext cx="5048738" cy="1720915"/>
+          </a:xfrm>
+          <a:prstGeom prst="rect">
+            <a:avLst/>
+          </a:prstGeom>
+        </p:spPr>
+      </p:pic>
+    </p:spTree>
+    <p:extLst>
+      <p:ext uri="{BB962C8B-B14F-4D97-AF65-F5344CB8AC3E}">
+        <p14:creationId xmlns:p14="http://schemas.microsoft.com/office/powerpoint/2010/main" val="2439308923"/>
+      </p:ext>
+    </p:extLst>
+  </p:cSld>
+  <p:clrMapOvr>
+    <a:masterClrMapping/>
+  </p:clrMapOvr>
+</p:sld>
+</file>
+
+<file path=ppt/slides/slide9.xml><?xml version="1.0" encoding="utf-8"?>
+<p:sld xmlns:a="http://schemas.openxmlformats.org/drawingml/2006/main" xmlns:r="http://schemas.openxmlformats.org/officeDocument/2006/relationships" xmlns:p="http://schemas.openxmlformats.org/presentationml/2006/main">
+  <p:cSld>
+    <p:spTree>
+      <p:nvGrpSpPr>
+        <p:cNvPr id="1" name=""/>
+        <p:cNvGrpSpPr/>
+        <p:nvPr/>
+      </p:nvGrpSpPr>
+      <p:grpSpPr>
+        <a:xfrm>
+          <a:off x="0" y="0"/>
+          <a:ext cx="0" cy="0"/>
+          <a:chOff x="0" y="0"/>
+          <a:chExt cx="0" cy="0"/>
+        </a:xfrm>
+      </p:grpSpPr>
+      <p:sp>
+        <p:nvSpPr>
+          <p:cNvPr id="3" name="Прямоугольник 4">
+            <a:extLst>
+              <a:ext uri="{FF2B5EF4-FFF2-40B4-BE49-F238E27FC236}">
+                <a16:creationId xmlns:a16="http://schemas.microsoft.com/office/drawing/2014/main" id="{9EFBF64F-9720-49DD-BA71-D5940ABDAD2F}"/>
+              </a:ext>
+            </a:extLst>
+          </p:cNvPr>
+          <p:cNvSpPr/>
+          <p:nvPr/>
+        </p:nvSpPr>
+        <p:spPr>
+          <a:xfrm>
+            <a:off x="569167" y="242596"/>
+            <a:ext cx="11150082" cy="811763"/>
+          </a:xfrm>
+          <a:prstGeom prst="rect">
+            <a:avLst/>
+          </a:prstGeom>
+        </p:spPr>
+        <p:style>
+          <a:lnRef idx="2">
+            <a:schemeClr val="accent1">
+              <a:shade val="50000"/>
+            </a:schemeClr>
+          </a:lnRef>
+          <a:fillRef idx="1">
+            <a:schemeClr val="accent1"/>
+          </a:fillRef>
+          <a:effectRef idx="0">
+            <a:schemeClr val="accent1"/>
+          </a:effectRef>
+          <a:fontRef idx="minor">
+            <a:schemeClr val="lt1"/>
+          </a:fontRef>
+        </p:style>
+        <p:txBody>
+          <a:bodyPr lIns="91440" tIns="45720" rIns="91440" bIns="45720" rtlCol="0" anchor="ctr"/>
+          <a:lstStyle/>
+          <a:p>
+            <a:pPr algn="ctr"/>
+            <a:r>
+              <a:rPr lang="ru-RU" sz="3200" b="1" dirty="0">
+                <a:ln w="12700" cmpd="sng">
+                  <a:solidFill>
+                    <a:srgbClr val="FFC000"/>
+                  </a:solidFill>
+                  <a:prstDash val="solid"/>
+                </a:ln>
+                <a:solidFill>
+                  <a:srgbClr val="FFC000"/>
+                </a:solidFill>
+                <a:ea typeface="+mn-lt"/>
+                <a:cs typeface="+mn-lt"/>
+              </a:rPr>
+              <a:t>Последовательности</a:t>
+            </a:r>
+            <a:endParaRPr lang="en-US" dirty="0"/>
+          </a:p>
+        </p:txBody>
+      </p:sp>
+      <p:pic>
+        <p:nvPicPr>
+          <p:cNvPr id="4" name="Picture 4">
+            <a:extLst>
+              <a:ext uri="{FF2B5EF4-FFF2-40B4-BE49-F238E27FC236}">
+                <a16:creationId xmlns:a16="http://schemas.microsoft.com/office/drawing/2014/main" id="{186976F7-CE8D-4266-97C7-16878D203E24}"/>
+              </a:ext>
+            </a:extLst>
+          </p:cNvPr>
+          <p:cNvPicPr>
+            <a:picLocks noChangeAspect="1"/>
+          </p:cNvPicPr>
+          <p:nvPr/>
+        </p:nvPicPr>
+        <p:blipFill>
+          <a:blip r:embed="rId2"/>
+          <a:stretch>
+            <a:fillRect/>
+          </a:stretch>
+        </p:blipFill>
+        <p:spPr>
+          <a:xfrm>
+            <a:off x="3640015" y="1444987"/>
+            <a:ext cx="5439506" cy="3587024"/>
+          </a:xfrm>
+          <a:prstGeom prst="rect">
+            <a:avLst/>
+          </a:prstGeom>
+        </p:spPr>
+      </p:pic>
+      <p:sp>
+        <p:nvSpPr>
+          <p:cNvPr id="5" name="Rectangle: Rounded Corners 4">
+            <a:extLst>
+              <a:ext uri="{FF2B5EF4-FFF2-40B4-BE49-F238E27FC236}">
+                <a16:creationId xmlns:a16="http://schemas.microsoft.com/office/drawing/2014/main" id="{FB53039F-7F97-4FC8-8621-5928458323A8}"/>
+              </a:ext>
+            </a:extLst>
+          </p:cNvPr>
+          <p:cNvSpPr/>
+          <p:nvPr/>
+        </p:nvSpPr>
+        <p:spPr>
+          <a:xfrm>
+            <a:off x="1477107" y="5375030"/>
+            <a:ext cx="10169768" cy="1309076"/>
+          </a:xfrm>
+          <a:prstGeom prst="roundRect">
+            <a:avLst/>
+          </a:prstGeom>
+        </p:spPr>
+        <p:style>
+          <a:lnRef idx="2">
+            <a:schemeClr val="accent1">
+              <a:shade val="50000"/>
+            </a:schemeClr>
+          </a:lnRef>
+          <a:fillRef idx="1">
+            <a:schemeClr val="accent1"/>
+          </a:fillRef>
+          <a:effectRef idx="0">
+            <a:schemeClr val="accent1"/>
+          </a:effectRef>
+          <a:fontRef idx="minor">
+            <a:schemeClr val="lt1"/>
+          </a:fontRef>
+        </p:style>
+        <p:txBody>
+          <a:bodyPr rtlCol="0" anchor="ctr"/>
+          <a:lstStyle/>
+          <a:p>
+            <a:pPr algn="ctr"/>
+            <a:r>
+              <a:rPr lang="en-US" dirty="0" err="1">
+                <a:ea typeface="+mn-lt"/>
+                <a:cs typeface="+mn-lt"/>
+              </a:rPr>
+              <a:t>Основные</a:t>
+            </a:r>
+            <a:r>
+              <a:rPr lang="en-US" dirty="0">
+                <a:ea typeface="+mn-lt"/>
+                <a:cs typeface="+mn-lt"/>
+              </a:rPr>
+              <a:t> </a:t>
+            </a:r>
+            <a:r>
+              <a:rPr lang="en-US" dirty="0" err="1">
+                <a:ea typeface="+mn-lt"/>
+                <a:cs typeface="+mn-lt"/>
+              </a:rPr>
+              <a:t>возможности</a:t>
+            </a:r>
+            <a:r>
+              <a:rPr lang="en-US" dirty="0">
+                <a:ea typeface="+mn-lt"/>
+                <a:cs typeface="+mn-lt"/>
+              </a:rPr>
+              <a:t> – </a:t>
+            </a:r>
+            <a:r>
+              <a:rPr lang="en-US" dirty="0" err="1">
+                <a:ea typeface="+mn-lt"/>
+                <a:cs typeface="+mn-lt"/>
+              </a:rPr>
+              <a:t>это</a:t>
+            </a:r>
+            <a:r>
+              <a:rPr lang="en-US" dirty="0">
+                <a:ea typeface="+mn-lt"/>
+                <a:cs typeface="+mn-lt"/>
+              </a:rPr>
+              <a:t> </a:t>
+            </a:r>
+            <a:r>
+              <a:rPr lang="en-US" dirty="0" err="1">
+                <a:solidFill>
+                  <a:schemeClr val="accent4"/>
+                </a:solidFill>
+                <a:ea typeface="+mn-lt"/>
+                <a:cs typeface="+mn-lt"/>
+              </a:rPr>
+              <a:t>проверка</a:t>
+            </a:r>
+            <a:r>
+              <a:rPr lang="en-US" dirty="0">
+                <a:solidFill>
+                  <a:schemeClr val="accent4"/>
+                </a:solidFill>
+                <a:ea typeface="+mn-lt"/>
+                <a:cs typeface="+mn-lt"/>
+              </a:rPr>
+              <a:t> </a:t>
+            </a:r>
+            <a:r>
+              <a:rPr lang="en-US" dirty="0" err="1">
+                <a:solidFill>
+                  <a:schemeClr val="accent4"/>
+                </a:solidFill>
+                <a:ea typeface="+mn-lt"/>
+                <a:cs typeface="+mn-lt"/>
+              </a:rPr>
+              <a:t>принадлежности</a:t>
+            </a:r>
+            <a:r>
+              <a:rPr lang="en-US" dirty="0">
+                <a:ea typeface="+mn-lt"/>
+                <a:cs typeface="+mn-lt"/>
+              </a:rPr>
+              <a:t> (</a:t>
+            </a:r>
+            <a:r>
+              <a:rPr lang="en-US" dirty="0" err="1">
+                <a:ea typeface="+mn-lt"/>
+                <a:cs typeface="+mn-lt"/>
+              </a:rPr>
+              <a:t>т.е</a:t>
+            </a:r>
+            <a:r>
+              <a:rPr lang="en-US" dirty="0">
+                <a:ea typeface="+mn-lt"/>
+                <a:cs typeface="+mn-lt"/>
+              </a:rPr>
+              <a:t>. </a:t>
+            </a:r>
+            <a:r>
+              <a:rPr lang="en-US" dirty="0" err="1">
+                <a:ea typeface="+mn-lt"/>
+                <a:cs typeface="+mn-lt"/>
+              </a:rPr>
+              <a:t>выражения</a:t>
+            </a:r>
+            <a:r>
+              <a:rPr lang="en-US" dirty="0">
+                <a:ea typeface="+mn-lt"/>
+                <a:cs typeface="+mn-lt"/>
+              </a:rPr>
+              <a:t> « in » и « not</a:t>
+            </a:r>
+            <a:endParaRPr lang="en-US" dirty="0"/>
+          </a:p>
+          <a:p>
+            <a:pPr algn="ctr"/>
+            <a:r>
+              <a:rPr lang="en-US" dirty="0">
+                <a:ea typeface="+mn-lt"/>
+                <a:cs typeface="+mn-lt"/>
+              </a:rPr>
+              <a:t>in ») и </a:t>
+            </a:r>
+            <a:r>
+              <a:rPr lang="en-US" dirty="0" err="1">
+                <a:solidFill>
+                  <a:schemeClr val="accent4"/>
+                </a:solidFill>
+                <a:ea typeface="+mn-lt"/>
+                <a:cs typeface="+mn-lt"/>
+              </a:rPr>
+              <a:t>оператор</a:t>
+            </a:r>
+            <a:r>
+              <a:rPr lang="en-US" dirty="0">
+                <a:solidFill>
+                  <a:schemeClr val="accent4"/>
+                </a:solidFill>
+                <a:ea typeface="+mn-lt"/>
+                <a:cs typeface="+mn-lt"/>
+              </a:rPr>
+              <a:t> </a:t>
+            </a:r>
+            <a:r>
+              <a:rPr lang="en-US" dirty="0" err="1">
+                <a:solidFill>
+                  <a:schemeClr val="accent4"/>
+                </a:solidFill>
+                <a:ea typeface="+mn-lt"/>
+                <a:cs typeface="+mn-lt"/>
+              </a:rPr>
+              <a:t>индексирования</a:t>
+            </a:r>
+            <a:r>
+              <a:rPr lang="en-US" dirty="0">
+                <a:ea typeface="+mn-lt"/>
+                <a:cs typeface="+mn-lt"/>
+              </a:rPr>
+              <a:t>, </a:t>
+            </a:r>
+            <a:r>
+              <a:rPr lang="en-US" dirty="0" err="1">
+                <a:ea typeface="+mn-lt"/>
+                <a:cs typeface="+mn-lt"/>
+              </a:rPr>
+              <a:t>позволяющий</a:t>
+            </a:r>
+            <a:r>
+              <a:rPr lang="en-US" dirty="0">
+                <a:ea typeface="+mn-lt"/>
+                <a:cs typeface="+mn-lt"/>
+              </a:rPr>
+              <a:t> </a:t>
+            </a:r>
+            <a:r>
+              <a:rPr lang="en-US" dirty="0" err="1">
+                <a:ea typeface="+mn-lt"/>
+                <a:cs typeface="+mn-lt"/>
+              </a:rPr>
+              <a:t>получить</a:t>
+            </a:r>
+            <a:r>
+              <a:rPr lang="en-US" dirty="0">
+                <a:ea typeface="+mn-lt"/>
+                <a:cs typeface="+mn-lt"/>
+              </a:rPr>
+              <a:t> </a:t>
+            </a:r>
+            <a:r>
+              <a:rPr lang="en-US" dirty="0" err="1">
+                <a:ea typeface="+mn-lt"/>
+                <a:cs typeface="+mn-lt"/>
+              </a:rPr>
+              <a:t>напрямую</a:t>
+            </a:r>
+            <a:r>
+              <a:rPr lang="en-US" dirty="0">
+                <a:ea typeface="+mn-lt"/>
+                <a:cs typeface="+mn-lt"/>
+              </a:rPr>
+              <a:t> </a:t>
+            </a:r>
+            <a:r>
+              <a:rPr lang="en-US" dirty="0" err="1">
+                <a:ea typeface="+mn-lt"/>
+                <a:cs typeface="+mn-lt"/>
+              </a:rPr>
+              <a:t>некоторый</a:t>
+            </a:r>
+            <a:r>
+              <a:rPr lang="en-US" dirty="0">
+                <a:ea typeface="+mn-lt"/>
+                <a:cs typeface="+mn-lt"/>
+              </a:rPr>
+              <a:t> </a:t>
+            </a:r>
+            <a:r>
+              <a:rPr lang="en-US" dirty="0" err="1">
+                <a:ea typeface="+mn-lt"/>
+                <a:cs typeface="+mn-lt"/>
+              </a:rPr>
+              <a:t>эле</a:t>
+            </a:r>
+            <a:r>
+              <a:rPr lang="en-US" dirty="0">
+                <a:ea typeface="+mn-lt"/>
+                <a:cs typeface="+mn-lt"/>
+              </a:rPr>
+              <a:t>-</a:t>
+            </a:r>
+            <a:endParaRPr lang="en-US" dirty="0"/>
+          </a:p>
+          <a:p>
+            <a:pPr algn="ctr"/>
+            <a:r>
+              <a:rPr lang="en-US" dirty="0" err="1">
+                <a:ea typeface="+mn-lt"/>
+                <a:cs typeface="+mn-lt"/>
+              </a:rPr>
+              <a:t>мент</a:t>
+            </a:r>
+            <a:r>
+              <a:rPr lang="en-US" dirty="0">
+                <a:ea typeface="+mn-lt"/>
+                <a:cs typeface="+mn-lt"/>
+              </a:rPr>
+              <a:t> </a:t>
+            </a:r>
+            <a:r>
+              <a:rPr lang="en-US" dirty="0" err="1">
+                <a:ea typeface="+mn-lt"/>
+                <a:cs typeface="+mn-lt"/>
+              </a:rPr>
+              <a:t>последовательности</a:t>
+            </a:r>
+            <a:r>
+              <a:rPr lang="en-US" dirty="0">
+                <a:ea typeface="+mn-lt"/>
+                <a:cs typeface="+mn-lt"/>
+              </a:rPr>
+              <a:t>.</a:t>
+            </a:r>
+            <a:endParaRPr lang="en-US" dirty="0"/>
+          </a:p>
+        </p:txBody>
+      </p:sp>
+    </p:spTree>
+    <p:extLst>
+      <p:ext uri="{BB962C8B-B14F-4D97-AF65-F5344CB8AC3E}">
+        <p14:creationId xmlns:p14="http://schemas.microsoft.com/office/powerpoint/2010/main" val="4086243325"/>
       </p:ext>
     </p:extLst>
   </p:cSld>

</xml_diff>